<commit_message>
Update informations and add ryan image in there
</commit_message>
<xml_diff>
--- a/Presentation1.pptx
+++ b/Presentation1.pptx
@@ -246,7 +246,7 @@
           <a:p>
             <a:fld id="{CCE5AF37-0B63-F645-B494-4A75110D1139}" type="datetimeFigureOut">
               <a:rPr lang="en-US" smtClean="0"/>
-              <a:t>7/20/17</a:t>
+              <a:t>7/23/17</a:t>
             </a:fld>
             <a:endParaRPr lang="en-US"/>
           </a:p>
@@ -416,7 +416,7 @@
           <a:p>
             <a:fld id="{CCE5AF37-0B63-F645-B494-4A75110D1139}" type="datetimeFigureOut">
               <a:rPr lang="en-US" smtClean="0"/>
-              <a:t>7/20/17</a:t>
+              <a:t>7/23/17</a:t>
             </a:fld>
             <a:endParaRPr lang="en-US"/>
           </a:p>
@@ -596,7 +596,7 @@
           <a:p>
             <a:fld id="{CCE5AF37-0B63-F645-B494-4A75110D1139}" type="datetimeFigureOut">
               <a:rPr lang="en-US" smtClean="0"/>
-              <a:t>7/20/17</a:t>
+              <a:t>7/23/17</a:t>
             </a:fld>
             <a:endParaRPr lang="en-US"/>
           </a:p>
@@ -766,7 +766,7 @@
           <a:p>
             <a:fld id="{CCE5AF37-0B63-F645-B494-4A75110D1139}" type="datetimeFigureOut">
               <a:rPr lang="en-US" smtClean="0"/>
-              <a:t>7/20/17</a:t>
+              <a:t>7/23/17</a:t>
             </a:fld>
             <a:endParaRPr lang="en-US"/>
           </a:p>
@@ -1012,7 +1012,7 @@
           <a:p>
             <a:fld id="{CCE5AF37-0B63-F645-B494-4A75110D1139}" type="datetimeFigureOut">
               <a:rPr lang="en-US" smtClean="0"/>
-              <a:t>7/20/17</a:t>
+              <a:t>7/23/17</a:t>
             </a:fld>
             <a:endParaRPr lang="en-US"/>
           </a:p>
@@ -1244,7 +1244,7 @@
           <a:p>
             <a:fld id="{CCE5AF37-0B63-F645-B494-4A75110D1139}" type="datetimeFigureOut">
               <a:rPr lang="en-US" smtClean="0"/>
-              <a:t>7/20/17</a:t>
+              <a:t>7/23/17</a:t>
             </a:fld>
             <a:endParaRPr lang="en-US"/>
           </a:p>
@@ -1611,7 +1611,7 @@
           <a:p>
             <a:fld id="{CCE5AF37-0B63-F645-B494-4A75110D1139}" type="datetimeFigureOut">
               <a:rPr lang="en-US" smtClean="0"/>
-              <a:t>7/20/17</a:t>
+              <a:t>7/23/17</a:t>
             </a:fld>
             <a:endParaRPr lang="en-US"/>
           </a:p>
@@ -1729,7 +1729,7 @@
           <a:p>
             <a:fld id="{CCE5AF37-0B63-F645-B494-4A75110D1139}" type="datetimeFigureOut">
               <a:rPr lang="en-US" smtClean="0"/>
-              <a:t>7/20/17</a:t>
+              <a:t>7/23/17</a:t>
             </a:fld>
             <a:endParaRPr lang="en-US"/>
           </a:p>
@@ -1824,7 +1824,7 @@
           <a:p>
             <a:fld id="{CCE5AF37-0B63-F645-B494-4A75110D1139}" type="datetimeFigureOut">
               <a:rPr lang="en-US" smtClean="0"/>
-              <a:t>7/20/17</a:t>
+              <a:t>7/23/17</a:t>
             </a:fld>
             <a:endParaRPr lang="en-US"/>
           </a:p>
@@ -2101,7 +2101,7 @@
           <a:p>
             <a:fld id="{CCE5AF37-0B63-F645-B494-4A75110D1139}" type="datetimeFigureOut">
               <a:rPr lang="en-US" smtClean="0"/>
-              <a:t>7/20/17</a:t>
+              <a:t>7/23/17</a:t>
             </a:fld>
             <a:endParaRPr lang="en-US"/>
           </a:p>
@@ -2354,7 +2354,7 @@
           <a:p>
             <a:fld id="{CCE5AF37-0B63-F645-B494-4A75110D1139}" type="datetimeFigureOut">
               <a:rPr lang="en-US" smtClean="0"/>
-              <a:t>7/20/17</a:t>
+              <a:t>7/23/17</a:t>
             </a:fld>
             <a:endParaRPr lang="en-US"/>
           </a:p>
@@ -2567,7 +2567,7 @@
           <a:p>
             <a:fld id="{CCE5AF37-0B63-F645-B494-4A75110D1139}" type="datetimeFigureOut">
               <a:rPr lang="en-US" smtClean="0"/>
-              <a:t>7/20/17</a:t>
+              <a:t>7/23/17</a:t>
             </a:fld>
             <a:endParaRPr lang="en-US"/>
           </a:p>
@@ -3075,7 +3075,9 @@
       <p:grpSp>
         <p:nvGrpSpPr>
           <p:cNvPr id="7" name="Group 6"/>
-          <p:cNvGrpSpPr/>
+          <p:cNvGrpSpPr>
+            <a:grpSpLocks noChangeAspect="1"/>
+          </p:cNvGrpSpPr>
           <p:nvPr/>
         </p:nvGrpSpPr>
         <p:grpSpPr>

</xml_diff>